<commit_message>
Update PPTX: Converted from modern Metropolis LaTeX PDF
</commit_message>
<xml_diff>
--- a/wifi6-cac-research/Paper/presentation.pptx
+++ b/wifi6-cac-research/Paper/presentation.pptx
@@ -17,8 +17,13 @@
     <p:sldId id="265" r:id="rId16"/>
     <p:sldId id="266" r:id="rId17"/>
     <p:sldId id="267" r:id="rId18"/>
+    <p:sldId id="268" r:id="rId19"/>
+    <p:sldId id="269" r:id="rId20"/>
+    <p:sldId id="270" r:id="rId21"/>
+    <p:sldId id="271" r:id="rId22"/>
+    <p:sldId id="272" r:id="rId23"/>
   </p:sldIdLst>
-  <p:sldSz cx="9144000" cy="6858000" type="screen4x3"/>
+  <p:sldSz cx="4608576" cy="3456432" type="screen4x3"/>
   <p:notesSz cx="6858000" cy="9144000"/>
   <p:defaultTextStyle>
     <a:defPPr>
@@ -3099,69 +3104,30 @@
         <p:nvPr/>
       </p:nvGrpSpPr>
       <p:grpSpPr/>
-      <p:sp>
-        <p:nvSpPr>
-          <p:cNvPr id="2" name="Title 1"/>
-          <p:cNvSpPr>
-            <a:spLocks noGrp="1"/>
-          </p:cNvSpPr>
-          <p:nvPr>
-            <p:ph type="ctrTitle"/>
-          </p:nvPr>
-        </p:nvSpPr>
-        <p:spPr/>
-        <p:txBody>
-          <a:bodyPr/>
-          <a:lstStyle/>
-          <a:p>
-            <a:r>
-              <a:t>Enhancing QoS in Dense IEEE 802.11ax Settings</a:t>
-            </a:r>
-          </a:p>
-          <a:p>
-            <a:r>
-              <a:t>using a Dynamic Airtime-Based Soft Admission Control Mechanism</a:t>
-            </a:r>
-          </a:p>
-        </p:txBody>
-      </p:sp>
-      <p:sp>
-        <p:nvSpPr>
-          <p:cNvPr id="3" name="Subtitle 2"/>
-          <p:cNvSpPr>
-            <a:spLocks noGrp="1"/>
-          </p:cNvSpPr>
-          <p:nvPr>
-            <p:ph type="subTitle" idx="1"/>
-          </p:nvPr>
-        </p:nvSpPr>
-        <p:spPr/>
-        <p:txBody>
-          <a:bodyPr/>
-          <a:lstStyle/>
-          <a:p>
-            <a:r>
-              <a:t>Dayanand Ambawade &amp; Rohan Pawar</a:t>
-            </a:r>
-          </a:p>
-          <a:p/>
-          <a:p>
-            <a:r>
-              <a:t>10th International Conference on Systems, Control and Communications (ICSCC 2025)</a:t>
-            </a:r>
-          </a:p>
-          <a:p>
-            <a:r>
-              <a:t>Nagoya University, Japan</a:t>
-            </a:r>
-          </a:p>
-          <a:p>
-            <a:r>
-              <a:t>December 2025</a:t>
-            </a:r>
-          </a:p>
-        </p:txBody>
-      </p:sp>
+      <p:pic>
+        <p:nvPicPr>
+          <p:cNvPr id="2" name="Picture 1" descr="slide-01.png"/>
+          <p:cNvPicPr>
+            <a:picLocks noChangeAspect="1"/>
+          </p:cNvPicPr>
+          <p:nvPr/>
+        </p:nvPicPr>
+        <p:blipFill>
+          <a:blip r:embed="rId2"/>
+          <a:stretch>
+            <a:fillRect/>
+          </a:stretch>
+        </p:blipFill>
+        <p:spPr>
+          <a:xfrm>
+            <a:off x="0" y="0"/>
+            <a:ext cx="4608576" cy="3456432"/>
+          </a:xfrm>
+          <a:prstGeom prst="rect">
+            <a:avLst/>
+          </a:prstGeom>
+        </p:spPr>
+      </p:pic>
     </p:spTree>
   </p:cSld>
   <p:clrMapOvr>
@@ -3180,110 +3146,9 @@
         <p:nvPr/>
       </p:nvGrpSpPr>
       <p:grpSpPr/>
-      <p:sp>
-        <p:nvSpPr>
-          <p:cNvPr id="2" name="Title 1"/>
-          <p:cNvSpPr>
-            <a:spLocks noGrp="1"/>
-          </p:cNvSpPr>
-          <p:nvPr>
-            <p:ph type="title"/>
-          </p:nvPr>
-        </p:nvSpPr>
-        <p:spPr/>
-        <p:txBody>
-          <a:bodyPr/>
-          <a:lstStyle/>
-          <a:p>
-            <a:r>
-              <a:t>Multi-Dimensional Superiority</a:t>
-            </a:r>
-          </a:p>
-        </p:txBody>
-      </p:sp>
-      <p:sp>
-        <p:nvSpPr>
-          <p:cNvPr id="3" name="Content Placeholder 2"/>
-          <p:cNvSpPr>
-            <a:spLocks noGrp="1"/>
-          </p:cNvSpPr>
-          <p:nvPr>
-            <p:ph idx="1" sz="half"/>
-          </p:nvPr>
-        </p:nvSpPr>
-        <p:spPr/>
-        <p:txBody>
-          <a:bodyPr/>
-          <a:lstStyle/>
-          <a:p/>
-        </p:txBody>
-      </p:sp>
-      <p:sp>
-        <p:nvSpPr>
-          <p:cNvPr id="4" name="Content Placeholder 3"/>
-          <p:cNvSpPr>
-            <a:spLocks noGrp="1"/>
-          </p:cNvSpPr>
-          <p:nvPr>
-            <p:ph idx="2" sz="half"/>
-          </p:nvPr>
-        </p:nvSpPr>
-        <p:spPr/>
-        <p:txBody>
-          <a:bodyPr/>
-          <a:lstStyle/>
-          <a:p>
-            <a:r>
-              <a:t>Why AS-CAC+ Wins:</a:t>
-            </a:r>
-          </a:p>
-          <a:p>
-            <a:pPr>
-              <a:defRPr b="1"/>
-            </a:pPr>
-            <a:r>
-              <a:t>Adaptability</a:t>
-            </a:r>
-          </a:p>
-          <a:p>
-            <a:pPr lvl="1"/>
-            <a:r>
-              <a:t>Reacts to interference instantly.</a:t>
-            </a:r>
-          </a:p>
-          <a:p>
-            <a:pPr>
-              <a:defRPr b="1"/>
-            </a:pPr>
-            <a:r>
-              <a:t>Utilization</a:t>
-            </a:r>
-          </a:p>
-          <a:p>
-            <a:pPr lvl="1"/>
-            <a:r>
-              <a:t>97.4% vs 78% (Hard CAC).</a:t>
-            </a:r>
-          </a:p>
-          <a:p>
-            <a:pPr>
-              <a:defRPr b="1"/>
-            </a:pPr>
-            <a:r>
-              <a:t>Safety</a:t>
-            </a:r>
-          </a:p>
-          <a:p>
-            <a:pPr lvl="1"/>
-            <a:r>
-              <a:t>Keeps VoIP latency &lt; 2ms.</a:t>
-            </a:r>
-          </a:p>
-        </p:txBody>
-      </p:sp>
       <p:pic>
         <p:nvPicPr>
-          <p:cNvPr id="5" name="Picture 4" descr="ascac_radar_chart.png"/>
+          <p:cNvPr id="2" name="Picture 1" descr="slide-10.png"/>
           <p:cNvPicPr>
             <a:picLocks noChangeAspect="1"/>
           </p:cNvPicPr>
@@ -3297,8 +3162,8 @@
         </p:blipFill>
         <p:spPr>
           <a:xfrm>
-            <a:off x="457200" y="1600200"/>
-            <a:ext cx="4038600" cy="3439430"/>
+            <a:off x="0" y="0"/>
+            <a:ext cx="4608576" cy="3456432"/>
           </a:xfrm>
           <a:prstGeom prst="rect">
             <a:avLst/>
@@ -3323,83 +3188,30 @@
         <p:nvPr/>
       </p:nvGrpSpPr>
       <p:grpSpPr/>
-      <p:sp>
-        <p:nvSpPr>
-          <p:cNvPr id="2" name="Title 1"/>
-          <p:cNvSpPr>
-            <a:spLocks noGrp="1"/>
-          </p:cNvSpPr>
-          <p:nvPr>
-            <p:ph type="title"/>
-          </p:nvPr>
-        </p:nvSpPr>
-        <p:spPr/>
-        <p:txBody>
-          <a:bodyPr/>
-          <a:lstStyle/>
-          <a:p>
-            <a:r>
-              <a:t>Conclusion</a:t>
-            </a:r>
-          </a:p>
-        </p:txBody>
-      </p:sp>
-      <p:sp>
-        <p:nvSpPr>
-          <p:cNvPr id="3" name="Content Placeholder 2"/>
-          <p:cNvSpPr>
-            <a:spLocks noGrp="1"/>
-          </p:cNvSpPr>
-          <p:nvPr>
-            <p:ph idx="1"/>
-          </p:nvPr>
-        </p:nvSpPr>
-        <p:spPr/>
-        <p:txBody>
-          <a:bodyPr/>
-          <a:lstStyle/>
-          <a:p>
-            <a:r>
-              <a:t>Summary</a:t>
-            </a:r>
-          </a:p>
-          <a:p>
-            <a:pPr lvl="1"/>
-            <a:r>
-              <a:t>AS-CAC+ transforms admission control from static to dynamic.</a:t>
-            </a:r>
-          </a:p>
-          <a:p>
-            <a:pPr lvl="1"/>
-            <a:r>
-              <a:t>Safely unlocks 19.2% more capacity.</a:t>
-            </a:r>
-          </a:p>
-          <a:p>
-            <a:r>
-              <a:t>Key Achievements</a:t>
-            </a:r>
-          </a:p>
-          <a:p>
-            <a:pPr lvl="1"/>
-            <a:r>
-              <a:t>19.2% Throughput improvement.</a:t>
-            </a:r>
-          </a:p>
-          <a:p>
-            <a:pPr lvl="1"/>
-            <a:r>
-              <a:t>97.4% Channel Utilization.</a:t>
-            </a:r>
-          </a:p>
-          <a:p>
-            <a:pPr lvl="1"/>
-            <a:r>
-              <a:t>Strict QoS for VoIP validated.</a:t>
-            </a:r>
-          </a:p>
-        </p:txBody>
-      </p:sp>
+      <p:pic>
+        <p:nvPicPr>
+          <p:cNvPr id="2" name="Picture 1" descr="slide-11.png"/>
+          <p:cNvPicPr>
+            <a:picLocks noChangeAspect="1"/>
+          </p:cNvPicPr>
+          <p:nvPr/>
+        </p:nvPicPr>
+        <p:blipFill>
+          <a:blip r:embed="rId2"/>
+          <a:stretch>
+            <a:fillRect/>
+          </a:stretch>
+        </p:blipFill>
+        <p:spPr>
+          <a:xfrm>
+            <a:off x="0" y="0"/>
+            <a:ext cx="4608576" cy="3456432"/>
+          </a:xfrm>
+          <a:prstGeom prst="rect">
+            <a:avLst/>
+          </a:prstGeom>
+        </p:spPr>
+      </p:pic>
     </p:spTree>
   </p:cSld>
   <p:clrMapOvr>
@@ -3418,59 +3230,240 @@
         <p:nvPr/>
       </p:nvGrpSpPr>
       <p:grpSpPr/>
-      <p:sp>
-        <p:nvSpPr>
-          <p:cNvPr id="2" name="Title 1"/>
-          <p:cNvSpPr>
-            <a:spLocks noGrp="1"/>
-          </p:cNvSpPr>
-          <p:nvPr>
-            <p:ph type="ctrTitle"/>
-          </p:nvPr>
-        </p:nvSpPr>
-        <p:spPr/>
-        <p:txBody>
-          <a:bodyPr/>
-          <a:lstStyle/>
-          <a:p>
-            <a:r>
-              <a:t>Thank You!</a:t>
-            </a:r>
-          </a:p>
-        </p:txBody>
-      </p:sp>
-      <p:sp>
-        <p:nvSpPr>
-          <p:cNvPr id="3" name="Subtitle 2"/>
-          <p:cNvSpPr>
-            <a:spLocks noGrp="1"/>
-          </p:cNvSpPr>
-          <p:nvPr>
-            <p:ph type="subTitle" idx="1"/>
-          </p:nvPr>
-        </p:nvSpPr>
-        <p:spPr/>
-        <p:txBody>
-          <a:bodyPr/>
-          <a:lstStyle/>
-          <a:p>
-            <a:r>
-              <a:t>Questions?</a:t>
-            </a:r>
-          </a:p>
-          <a:p/>
-          <a:p>
-            <a:r>
-              <a:t>Dayanand Ambawade &amp; Rohan Pawar</a:t>
-            </a:r>
-          </a:p>
-          <a:p>
-            <a:r>
-              <a:t>Sardar Patel Institute of Technology</a:t>
-            </a:r>
-          </a:p>
-        </p:txBody>
-      </p:sp>
+      <p:pic>
+        <p:nvPicPr>
+          <p:cNvPr id="2" name="Picture 1" descr="slide-12.png"/>
+          <p:cNvPicPr>
+            <a:picLocks noChangeAspect="1"/>
+          </p:cNvPicPr>
+          <p:nvPr/>
+        </p:nvPicPr>
+        <p:blipFill>
+          <a:blip r:embed="rId2"/>
+          <a:stretch>
+            <a:fillRect/>
+          </a:stretch>
+        </p:blipFill>
+        <p:spPr>
+          <a:xfrm>
+            <a:off x="0" y="0"/>
+            <a:ext cx="4608576" cy="3456432"/>
+          </a:xfrm>
+          <a:prstGeom prst="rect">
+            <a:avLst/>
+          </a:prstGeom>
+        </p:spPr>
+      </p:pic>
+    </p:spTree>
+  </p:cSld>
+  <p:clrMapOvr>
+    <a:masterClrMapping/>
+  </p:clrMapOvr>
+</p:sld>
+</file>
+
+<file path=ppt/slides/slide13.xml><?xml version="1.0" encoding="utf-8"?>
+<p:sld xmlns:a="http://schemas.openxmlformats.org/drawingml/2006/main" xmlns:p="http://schemas.openxmlformats.org/presentationml/2006/main" xmlns:r="http://schemas.openxmlformats.org/officeDocument/2006/relationships">
+  <p:cSld>
+    <p:spTree>
+      <p:nvGrpSpPr>
+        <p:cNvPr id="1" name=""/>
+        <p:cNvGrpSpPr/>
+        <p:nvPr/>
+      </p:nvGrpSpPr>
+      <p:grpSpPr/>
+      <p:pic>
+        <p:nvPicPr>
+          <p:cNvPr id="2" name="Picture 1" descr="slide-13.png"/>
+          <p:cNvPicPr>
+            <a:picLocks noChangeAspect="1"/>
+          </p:cNvPicPr>
+          <p:nvPr/>
+        </p:nvPicPr>
+        <p:blipFill>
+          <a:blip r:embed="rId2"/>
+          <a:stretch>
+            <a:fillRect/>
+          </a:stretch>
+        </p:blipFill>
+        <p:spPr>
+          <a:xfrm>
+            <a:off x="0" y="0"/>
+            <a:ext cx="4608576" cy="3456432"/>
+          </a:xfrm>
+          <a:prstGeom prst="rect">
+            <a:avLst/>
+          </a:prstGeom>
+        </p:spPr>
+      </p:pic>
+    </p:spTree>
+  </p:cSld>
+  <p:clrMapOvr>
+    <a:masterClrMapping/>
+  </p:clrMapOvr>
+</p:sld>
+</file>
+
+<file path=ppt/slides/slide14.xml><?xml version="1.0" encoding="utf-8"?>
+<p:sld xmlns:a="http://schemas.openxmlformats.org/drawingml/2006/main" xmlns:p="http://schemas.openxmlformats.org/presentationml/2006/main" xmlns:r="http://schemas.openxmlformats.org/officeDocument/2006/relationships">
+  <p:cSld>
+    <p:spTree>
+      <p:nvGrpSpPr>
+        <p:cNvPr id="1" name=""/>
+        <p:cNvGrpSpPr/>
+        <p:nvPr/>
+      </p:nvGrpSpPr>
+      <p:grpSpPr/>
+      <p:pic>
+        <p:nvPicPr>
+          <p:cNvPr id="2" name="Picture 1" descr="slide-14.png"/>
+          <p:cNvPicPr>
+            <a:picLocks noChangeAspect="1"/>
+          </p:cNvPicPr>
+          <p:nvPr/>
+        </p:nvPicPr>
+        <p:blipFill>
+          <a:blip r:embed="rId2"/>
+          <a:stretch>
+            <a:fillRect/>
+          </a:stretch>
+        </p:blipFill>
+        <p:spPr>
+          <a:xfrm>
+            <a:off x="0" y="0"/>
+            <a:ext cx="4608576" cy="3456432"/>
+          </a:xfrm>
+          <a:prstGeom prst="rect">
+            <a:avLst/>
+          </a:prstGeom>
+        </p:spPr>
+      </p:pic>
+    </p:spTree>
+  </p:cSld>
+  <p:clrMapOvr>
+    <a:masterClrMapping/>
+  </p:clrMapOvr>
+</p:sld>
+</file>
+
+<file path=ppt/slides/slide15.xml><?xml version="1.0" encoding="utf-8"?>
+<p:sld xmlns:a="http://schemas.openxmlformats.org/drawingml/2006/main" xmlns:p="http://schemas.openxmlformats.org/presentationml/2006/main" xmlns:r="http://schemas.openxmlformats.org/officeDocument/2006/relationships">
+  <p:cSld>
+    <p:spTree>
+      <p:nvGrpSpPr>
+        <p:cNvPr id="1" name=""/>
+        <p:cNvGrpSpPr/>
+        <p:nvPr/>
+      </p:nvGrpSpPr>
+      <p:grpSpPr/>
+      <p:pic>
+        <p:nvPicPr>
+          <p:cNvPr id="2" name="Picture 1" descr="slide-15.png"/>
+          <p:cNvPicPr>
+            <a:picLocks noChangeAspect="1"/>
+          </p:cNvPicPr>
+          <p:nvPr/>
+        </p:nvPicPr>
+        <p:blipFill>
+          <a:blip r:embed="rId2"/>
+          <a:stretch>
+            <a:fillRect/>
+          </a:stretch>
+        </p:blipFill>
+        <p:spPr>
+          <a:xfrm>
+            <a:off x="0" y="0"/>
+            <a:ext cx="4608576" cy="3456432"/>
+          </a:xfrm>
+          <a:prstGeom prst="rect">
+            <a:avLst/>
+          </a:prstGeom>
+        </p:spPr>
+      </p:pic>
+    </p:spTree>
+  </p:cSld>
+  <p:clrMapOvr>
+    <a:masterClrMapping/>
+  </p:clrMapOvr>
+</p:sld>
+</file>
+
+<file path=ppt/slides/slide16.xml><?xml version="1.0" encoding="utf-8"?>
+<p:sld xmlns:a="http://schemas.openxmlformats.org/drawingml/2006/main" xmlns:p="http://schemas.openxmlformats.org/presentationml/2006/main" xmlns:r="http://schemas.openxmlformats.org/officeDocument/2006/relationships">
+  <p:cSld>
+    <p:spTree>
+      <p:nvGrpSpPr>
+        <p:cNvPr id="1" name=""/>
+        <p:cNvGrpSpPr/>
+        <p:nvPr/>
+      </p:nvGrpSpPr>
+      <p:grpSpPr/>
+      <p:pic>
+        <p:nvPicPr>
+          <p:cNvPr id="2" name="Picture 1" descr="slide-16.png"/>
+          <p:cNvPicPr>
+            <a:picLocks noChangeAspect="1"/>
+          </p:cNvPicPr>
+          <p:nvPr/>
+        </p:nvPicPr>
+        <p:blipFill>
+          <a:blip r:embed="rId2"/>
+          <a:stretch>
+            <a:fillRect/>
+          </a:stretch>
+        </p:blipFill>
+        <p:spPr>
+          <a:xfrm>
+            <a:off x="0" y="0"/>
+            <a:ext cx="4608576" cy="3456432"/>
+          </a:xfrm>
+          <a:prstGeom prst="rect">
+            <a:avLst/>
+          </a:prstGeom>
+        </p:spPr>
+      </p:pic>
+    </p:spTree>
+  </p:cSld>
+  <p:clrMapOvr>
+    <a:masterClrMapping/>
+  </p:clrMapOvr>
+</p:sld>
+</file>
+
+<file path=ppt/slides/slide17.xml><?xml version="1.0" encoding="utf-8"?>
+<p:sld xmlns:a="http://schemas.openxmlformats.org/drawingml/2006/main" xmlns:p="http://schemas.openxmlformats.org/presentationml/2006/main" xmlns:r="http://schemas.openxmlformats.org/officeDocument/2006/relationships">
+  <p:cSld>
+    <p:spTree>
+      <p:nvGrpSpPr>
+        <p:cNvPr id="1" name=""/>
+        <p:cNvGrpSpPr/>
+        <p:nvPr/>
+      </p:nvGrpSpPr>
+      <p:grpSpPr/>
+      <p:pic>
+        <p:nvPicPr>
+          <p:cNvPr id="2" name="Picture 1" descr="slide-17.png"/>
+          <p:cNvPicPr>
+            <a:picLocks noChangeAspect="1"/>
+          </p:cNvPicPr>
+          <p:nvPr/>
+        </p:nvPicPr>
+        <p:blipFill>
+          <a:blip r:embed="rId2"/>
+          <a:stretch>
+            <a:fillRect/>
+          </a:stretch>
+        </p:blipFill>
+        <p:spPr>
+          <a:xfrm>
+            <a:off x="0" y="0"/>
+            <a:ext cx="4608576" cy="3456432"/>
+          </a:xfrm>
+          <a:prstGeom prst="rect">
+            <a:avLst/>
+          </a:prstGeom>
+        </p:spPr>
+      </p:pic>
     </p:spTree>
   </p:cSld>
   <p:clrMapOvr>
@@ -3489,68 +3482,30 @@
         <p:nvPr/>
       </p:nvGrpSpPr>
       <p:grpSpPr/>
-      <p:sp>
-        <p:nvSpPr>
-          <p:cNvPr id="2" name="Title 1"/>
-          <p:cNvSpPr>
-            <a:spLocks noGrp="1"/>
-          </p:cNvSpPr>
-          <p:nvPr>
-            <p:ph type="title"/>
-          </p:nvPr>
-        </p:nvSpPr>
-        <p:spPr/>
-        <p:txBody>
-          <a:bodyPr/>
-          <a:lstStyle/>
-          <a:p>
-            <a:r>
-              <a:t>Outline</a:t>
-            </a:r>
-          </a:p>
-        </p:txBody>
-      </p:sp>
-      <p:sp>
-        <p:nvSpPr>
-          <p:cNvPr id="3" name="Content Placeholder 2"/>
-          <p:cNvSpPr>
-            <a:spLocks noGrp="1"/>
-          </p:cNvSpPr>
-          <p:nvPr>
-            <p:ph idx="1"/>
-          </p:nvPr>
-        </p:nvSpPr>
-        <p:spPr/>
-        <p:txBody>
-          <a:bodyPr/>
-          <a:lstStyle/>
-          <a:p>
-            <a:r>
-              <a:t>Introduction &amp; Motivation</a:t>
-            </a:r>
-          </a:p>
-          <a:p>
-            <a:r>
-              <a:t>System Architecture</a:t>
-            </a:r>
-          </a:p>
-          <a:p>
-            <a:r>
-              <a:t>Proposed AS-CAC Framework</a:t>
-            </a:r>
-          </a:p>
-          <a:p>
-            <a:r>
-              <a:t>Performance Evaluation</a:t>
-            </a:r>
-          </a:p>
-          <a:p>
-            <a:r>
-              <a:t>Conclusion</a:t>
-            </a:r>
-          </a:p>
-        </p:txBody>
-      </p:sp>
+      <p:pic>
+        <p:nvPicPr>
+          <p:cNvPr id="2" name="Picture 1" descr="slide-02.png"/>
+          <p:cNvPicPr>
+            <a:picLocks noChangeAspect="1"/>
+          </p:cNvPicPr>
+          <p:nvPr/>
+        </p:nvPicPr>
+        <p:blipFill>
+          <a:blip r:embed="rId2"/>
+          <a:stretch>
+            <a:fillRect/>
+          </a:stretch>
+        </p:blipFill>
+        <p:spPr>
+          <a:xfrm>
+            <a:off x="0" y="0"/>
+            <a:ext cx="4608576" cy="3456432"/>
+          </a:xfrm>
+          <a:prstGeom prst="rect">
+            <a:avLst/>
+          </a:prstGeom>
+        </p:spPr>
+      </p:pic>
     </p:spTree>
   </p:cSld>
   <p:clrMapOvr>
@@ -3569,99 +3524,30 @@
         <p:nvPr/>
       </p:nvGrpSpPr>
       <p:grpSpPr/>
-      <p:sp>
-        <p:nvSpPr>
-          <p:cNvPr id="2" name="Title 1"/>
-          <p:cNvSpPr>
-            <a:spLocks noGrp="1"/>
-          </p:cNvSpPr>
-          <p:nvPr>
-            <p:ph type="title"/>
-          </p:nvPr>
-        </p:nvSpPr>
-        <p:spPr/>
-        <p:txBody>
-          <a:bodyPr/>
-          <a:lstStyle/>
-          <a:p>
-            <a:r>
-              <a:t>Motivation</a:t>
-            </a:r>
-          </a:p>
-        </p:txBody>
-      </p:sp>
-      <p:sp>
-        <p:nvSpPr>
-          <p:cNvPr id="3" name="Content Placeholder 2"/>
-          <p:cNvSpPr>
-            <a:spLocks noGrp="1"/>
-          </p:cNvSpPr>
-          <p:nvPr>
-            <p:ph idx="1"/>
-          </p:nvPr>
-        </p:nvSpPr>
-        <p:spPr/>
-        <p:txBody>
-          <a:bodyPr/>
-          <a:lstStyle/>
-          <a:p>
-            <a:pPr>
-              <a:defRPr b="1"/>
-            </a:pPr>
-            <a:r>
-              <a:t>The Challenge</a:t>
-            </a:r>
-          </a:p>
-          <a:p>
-            <a:pPr lvl="1"/>
-            <a:r>
-              <a:t>IEEE 802.11ax (Wi-Fi 6) improves spectral efficiency but struggles under saturation in dense environments.</a:t>
-            </a:r>
-          </a:p>
-          <a:p>
-            <a:pPr>
-              <a:defRPr b="1"/>
-            </a:pPr>
-            <a:r>
-              <a:t>QoS Issues</a:t>
-            </a:r>
-          </a:p>
-          <a:p>
-            <a:pPr lvl="1"/>
-            <a:r>
-              <a:t>Real-time applications (VoIP, Video) are sensitive to high delay and jitter caused by congestion.</a:t>
-            </a:r>
-          </a:p>
-          <a:p>
-            <a:pPr>
-              <a:defRPr b="1"/>
-            </a:pPr>
-            <a:r>
-              <a:t>Limitation of Existing CAC</a:t>
-            </a:r>
-          </a:p>
-          <a:p>
-            <a:pPr lvl="1"/>
-            <a:r>
-              <a:t>Traditional schemes ignore traffic heterogeneity (IoT vs 4K Video) and varying MCS.</a:t>
-            </a:r>
-          </a:p>
-          <a:p>
-            <a:pPr>
-              <a:defRPr b="1"/>
-            </a:pPr>
-            <a:r>
-              <a:t>Research Goal</a:t>
-            </a:r>
-          </a:p>
-          <a:p>
-            <a:pPr lvl="1"/>
-            <a:r>
-              <a:t>Develop admission control to maximize airtime utilization while guaranteeing strict QoS.</a:t>
-            </a:r>
-          </a:p>
-        </p:txBody>
-      </p:sp>
+      <p:pic>
+        <p:nvPicPr>
+          <p:cNvPr id="2" name="Picture 1" descr="slide-03.png"/>
+          <p:cNvPicPr>
+            <a:picLocks noChangeAspect="1"/>
+          </p:cNvPicPr>
+          <p:nvPr/>
+        </p:nvPicPr>
+        <p:blipFill>
+          <a:blip r:embed="rId2"/>
+          <a:stretch>
+            <a:fillRect/>
+          </a:stretch>
+        </p:blipFill>
+        <p:spPr>
+          <a:xfrm>
+            <a:off x="0" y="0"/>
+            <a:ext cx="4608576" cy="3456432"/>
+          </a:xfrm>
+          <a:prstGeom prst="rect">
+            <a:avLst/>
+          </a:prstGeom>
+        </p:spPr>
+      </p:pic>
     </p:spTree>
   </p:cSld>
   <p:clrMapOvr>
@@ -3680,104 +3566,9 @@
         <p:nvPr/>
       </p:nvGrpSpPr>
       <p:grpSpPr/>
-      <p:sp>
-        <p:nvSpPr>
-          <p:cNvPr id="2" name="Title 1"/>
-          <p:cNvSpPr>
-            <a:spLocks noGrp="1"/>
-          </p:cNvSpPr>
-          <p:nvPr>
-            <p:ph type="title"/>
-          </p:nvPr>
-        </p:nvSpPr>
-        <p:spPr/>
-        <p:txBody>
-          <a:bodyPr/>
-          <a:lstStyle/>
-          <a:p>
-            <a:r>
-              <a:t>Research Test Bed &amp; Components</a:t>
-            </a:r>
-          </a:p>
-        </p:txBody>
-      </p:sp>
-      <p:sp>
-        <p:nvSpPr>
-          <p:cNvPr id="3" name="Content Placeholder 2"/>
-          <p:cNvSpPr>
-            <a:spLocks noGrp="1"/>
-          </p:cNvSpPr>
-          <p:nvPr>
-            <p:ph idx="1" sz="half"/>
-          </p:nvPr>
-        </p:nvSpPr>
-        <p:spPr/>
-        <p:txBody>
-          <a:bodyPr/>
-          <a:lstStyle/>
-          <a:p>
-            <a:r>
-              <a:t>Simulation Components (ns-3):</a:t>
-            </a:r>
-          </a:p>
-          <a:p>
-            <a:pPr lvl="1"/>
-            <a:r>
-              <a:t>AP Node: Wi-Fi 6 (802.11ax), 80 MHz, 5 GHz</a:t>
-            </a:r>
-          </a:p>
-          <a:p>
-            <a:pPr lvl="1"/>
-            <a:r>
-              <a:t>Stations: 25-50 users in dense grid</a:t>
-            </a:r>
-          </a:p>
-          <a:p>
-            <a:pPr lvl="1"/>
-            <a:r>
-              <a:t>Traffic Generators:</a:t>
-            </a:r>
-          </a:p>
-          <a:p>
-            <a:pPr lvl="2"/>
-            <a:r>
-              <a:t>VoIP (UDP)</a:t>
-            </a:r>
-          </a:p>
-          <a:p>
-            <a:pPr lvl="2"/>
-            <a:r>
-              <a:t>Video (UDP)</a:t>
-            </a:r>
-          </a:p>
-          <a:p>
-            <a:pPr lvl="2"/>
-            <a:r>
-              <a:t>Bursty/Web (TCP/UDP)</a:t>
-            </a:r>
-          </a:p>
-        </p:txBody>
-      </p:sp>
-      <p:sp>
-        <p:nvSpPr>
-          <p:cNvPr id="4" name="Content Placeholder 3"/>
-          <p:cNvSpPr>
-            <a:spLocks noGrp="1"/>
-          </p:cNvSpPr>
-          <p:nvPr>
-            <p:ph idx="2" sz="half"/>
-          </p:nvPr>
-        </p:nvSpPr>
-        <p:spPr/>
-        <p:txBody>
-          <a:bodyPr/>
-          <a:lstStyle/>
-          <a:p/>
-        </p:txBody>
-      </p:sp>
       <p:pic>
         <p:nvPicPr>
-          <p:cNvPr id="5" name="Picture 4" descr="ns3_network_topology.png"/>
+          <p:cNvPr id="2" name="Picture 1" descr="slide-04.png"/>
           <p:cNvPicPr>
             <a:picLocks noChangeAspect="1"/>
           </p:cNvPicPr>
@@ -3791,8 +3582,8 @@
         </p:blipFill>
         <p:spPr>
           <a:xfrm>
-            <a:off x="4648200" y="1600200"/>
-            <a:ext cx="4038600" cy="3384742"/>
+            <a:off x="0" y="0"/>
+            <a:ext cx="4608576" cy="3456432"/>
           </a:xfrm>
           <a:prstGeom prst="rect">
             <a:avLst/>
@@ -3817,97 +3608,9 @@
         <p:nvPr/>
       </p:nvGrpSpPr>
       <p:grpSpPr/>
-      <p:sp>
-        <p:nvSpPr>
-          <p:cNvPr id="2" name="Title 1"/>
-          <p:cNvSpPr>
-            <a:spLocks noGrp="1"/>
-          </p:cNvSpPr>
-          <p:nvPr>
-            <p:ph type="title"/>
-          </p:nvPr>
-        </p:nvSpPr>
-        <p:spPr/>
-        <p:txBody>
-          <a:bodyPr/>
-          <a:lstStyle/>
-          <a:p>
-            <a:r>
-              <a:t>System Model and Traffic</a:t>
-            </a:r>
-          </a:p>
-        </p:txBody>
-      </p:sp>
-      <p:sp>
-        <p:nvSpPr>
-          <p:cNvPr id="3" name="Content Placeholder 2"/>
-          <p:cNvSpPr>
-            <a:spLocks noGrp="1"/>
-          </p:cNvSpPr>
-          <p:nvPr>
-            <p:ph idx="1" sz="half"/>
-          </p:nvPr>
-        </p:nvSpPr>
-        <p:spPr/>
-        <p:txBody>
-          <a:bodyPr/>
-          <a:lstStyle/>
-          <a:p>
-            <a:r>
-              <a:t>Metric: Airtime Utilization</a:t>
-            </a:r>
-          </a:p>
-          <a:p>
-            <a:pPr lvl="1"/>
-            <a:r>
-              <a:t>Calculated based on PHY rate and overhead.</a:t>
-            </a:r>
-          </a:p>
-          <a:p>
-            <a:r>
-              <a:t>Traffic Mix:</a:t>
-            </a:r>
-          </a:p>
-          <a:p>
-            <a:pPr lvl="1"/>
-            <a:r>
-              <a:t>VoIP: High Priority, Low Bandwidth</a:t>
-            </a:r>
-          </a:p>
-          <a:p>
-            <a:pPr lvl="1"/>
-            <a:r>
-              <a:t>Video: Medium Priority, High Bandwidth</a:t>
-            </a:r>
-          </a:p>
-          <a:p>
-            <a:pPr lvl="1"/>
-            <a:r>
-              <a:t>Best Effort: Low Priority, Bursty</a:t>
-            </a:r>
-          </a:p>
-        </p:txBody>
-      </p:sp>
-      <p:sp>
-        <p:nvSpPr>
-          <p:cNvPr id="4" name="Content Placeholder 3"/>
-          <p:cNvSpPr>
-            <a:spLocks noGrp="1"/>
-          </p:cNvSpPr>
-          <p:nvPr>
-            <p:ph idx="2" sz="half"/>
-          </p:nvPr>
-        </p:nvSpPr>
-        <p:spPr/>
-        <p:txBody>
-          <a:bodyPr/>
-          <a:lstStyle/>
-          <a:p/>
-        </p:txBody>
-      </p:sp>
       <p:pic>
         <p:nvPicPr>
-          <p:cNvPr id="5" name="Picture 4" descr="ap_station_distribution.png"/>
+          <p:cNvPr id="2" name="Picture 1" descr="slide-05.png"/>
           <p:cNvPicPr>
             <a:picLocks noChangeAspect="1"/>
           </p:cNvPicPr>
@@ -3921,8 +3624,8 @@
         </p:blipFill>
         <p:spPr>
           <a:xfrm>
-            <a:off x="4648200" y="1600200"/>
-            <a:ext cx="4038600" cy="2202873"/>
+            <a:off x="0" y="0"/>
+            <a:ext cx="4608576" cy="3456432"/>
           </a:xfrm>
           <a:prstGeom prst="rect">
             <a:avLst/>
@@ -3947,104 +3650,9 @@
         <p:nvPr/>
       </p:nvGrpSpPr>
       <p:grpSpPr/>
-      <p:sp>
-        <p:nvSpPr>
-          <p:cNvPr id="2" name="Title 1"/>
-          <p:cNvSpPr>
-            <a:spLocks noGrp="1"/>
-          </p:cNvSpPr>
-          <p:nvPr>
-            <p:ph type="title"/>
-          </p:nvPr>
-        </p:nvSpPr>
-        <p:spPr/>
-        <p:txBody>
-          <a:bodyPr/>
-          <a:lstStyle/>
-          <a:p>
-            <a:r>
-              <a:t>Proposed Solution: Soft CAC</a:t>
-            </a:r>
-          </a:p>
-        </p:txBody>
-      </p:sp>
-      <p:sp>
-        <p:nvSpPr>
-          <p:cNvPr id="3" name="Content Placeholder 2"/>
-          <p:cNvSpPr>
-            <a:spLocks noGrp="1"/>
-          </p:cNvSpPr>
-          <p:nvPr>
-            <p:ph idx="1" sz="half"/>
-          </p:nvPr>
-        </p:nvSpPr>
-        <p:spPr/>
-        <p:txBody>
-          <a:bodyPr/>
-          <a:lstStyle/>
-          <a:p>
-            <a:r>
-              <a:t>Concept: Priority-Aware Thresholds</a:t>
-            </a:r>
-          </a:p>
-          <a:p>
-            <a:pPr lvl="1"/>
-            <a:r>
-              <a:t>Instead of a single hard limit (e.g., 80%):</a:t>
-            </a:r>
-          </a:p>
-          <a:p>
-            <a:pPr lvl="1">
-              <a:defRPr b="1"/>
-            </a:pPr>
-            <a:r>
-              <a:t>VoIP (High): 90% Threshold</a:t>
-            </a:r>
-          </a:p>
-          <a:p>
-            <a:pPr lvl="1">
-              <a:defRPr b="1"/>
-            </a:pPr>
-            <a:r>
-              <a:t>Video (Medium): 80% Threshold</a:t>
-            </a:r>
-          </a:p>
-          <a:p>
-            <a:pPr lvl="1">
-              <a:defRPr b="1"/>
-            </a:pPr>
-            <a:r>
-              <a:t>Best Effort (Low): 95% Threshold</a:t>
-            </a:r>
-          </a:p>
-          <a:p>
-            <a:pPr lvl="1"/>
-            <a:r>
-              <a:t>Benefit: Best-effort traffic fills gaps without blocking high-priority flows.</a:t>
-            </a:r>
-          </a:p>
-        </p:txBody>
-      </p:sp>
-      <p:sp>
-        <p:nvSpPr>
-          <p:cNvPr id="4" name="Content Placeholder 3"/>
-          <p:cNvSpPr>
-            <a:spLocks noGrp="1"/>
-          </p:cNvSpPr>
-          <p:nvPr>
-            <p:ph idx="2" sz="half"/>
-          </p:nvPr>
-        </p:nvSpPr>
-        <p:spPr/>
-        <p:txBody>
-          <a:bodyPr/>
-          <a:lstStyle/>
-          <a:p/>
-        </p:txBody>
-      </p:sp>
       <p:pic>
         <p:nvPicPr>
-          <p:cNvPr id="5" name="Picture 4" descr="soft_vs_hard_cac_comparison.png"/>
+          <p:cNvPr id="2" name="Picture 1" descr="slide-06.png"/>
           <p:cNvPicPr>
             <a:picLocks noChangeAspect="1"/>
           </p:cNvPicPr>
@@ -4058,8 +3666,8 @@
         </p:blipFill>
         <p:spPr>
           <a:xfrm>
-            <a:off x="4648200" y="1600200"/>
-            <a:ext cx="4038600" cy="1121833"/>
+            <a:off x="0" y="0"/>
+            <a:ext cx="4608576" cy="3456432"/>
           </a:xfrm>
           <a:prstGeom prst="rect">
             <a:avLst/>
@@ -4084,100 +3692,9 @@
         <p:nvPr/>
       </p:nvGrpSpPr>
       <p:grpSpPr/>
-      <p:sp>
-        <p:nvSpPr>
-          <p:cNvPr id="2" name="Title 1"/>
-          <p:cNvSpPr>
-            <a:spLocks noGrp="1"/>
-          </p:cNvSpPr>
-          <p:nvPr>
-            <p:ph type="title"/>
-          </p:nvPr>
-        </p:nvSpPr>
-        <p:spPr/>
-        <p:txBody>
-          <a:bodyPr/>
-          <a:lstStyle/>
-          <a:p>
-            <a:r>
-              <a:t>Algorithm: AS-CAC+ (Adaptive)</a:t>
-            </a:r>
-          </a:p>
-        </p:txBody>
-      </p:sp>
-      <p:sp>
-        <p:nvSpPr>
-          <p:cNvPr id="3" name="Content Placeholder 2"/>
-          <p:cNvSpPr>
-            <a:spLocks noGrp="1"/>
-          </p:cNvSpPr>
-          <p:nvPr>
-            <p:ph idx="1" sz="half"/>
-          </p:nvPr>
-        </p:nvSpPr>
-        <p:spPr/>
-        <p:txBody>
-          <a:bodyPr/>
-          <a:lstStyle/>
-          <a:p>
-            <a:r>
-              <a:t>Dynamic Threshold Adjustment</a:t>
-            </a:r>
-          </a:p>
-          <a:p>
-            <a:pPr lvl="1"/>
-            <a:r>
-              <a:t>Monitors Packet Error Rate (PER) and Utilization.</a:t>
-            </a:r>
-          </a:p>
-          <a:p>
-            <a:pPr lvl="1"/>
-            <a:r>
-              <a:t>Adjusts Best-Effort threshold in real-time.</a:t>
-            </a:r>
-          </a:p>
-          <a:p>
-            <a:pPr lvl="1">
-              <a:defRPr b="1"/>
-            </a:pPr>
-            <a:r>
-              <a:t>Logic:</a:t>
-            </a:r>
-          </a:p>
-          <a:p>
-            <a:pPr lvl="2"/>
-            <a:r>
-              <a:t>If PER &gt; 5%: Decrease Threshold (Protect QoS)</a:t>
-            </a:r>
-          </a:p>
-          <a:p>
-            <a:pPr lvl="2"/>
-            <a:r>
-              <a:t>If PER &lt; 2%: Increase Threshold (Utilize Capacity)</a:t>
-            </a:r>
-          </a:p>
-        </p:txBody>
-      </p:sp>
-      <p:sp>
-        <p:nvSpPr>
-          <p:cNvPr id="4" name="Content Placeholder 3"/>
-          <p:cNvSpPr>
-            <a:spLocks noGrp="1"/>
-          </p:cNvSpPr>
-          <p:nvPr>
-            <p:ph idx="2" sz="half"/>
-          </p:nvPr>
-        </p:nvSpPr>
-        <p:spPr/>
-        <p:txBody>
-          <a:bodyPr/>
-          <a:lstStyle/>
-          <a:p/>
-        </p:txBody>
-      </p:sp>
       <p:pic>
         <p:nvPicPr>
-          <p:cNvPr id="5" name="Picture 4" descr="ascac_threshold_evolution.png"/>
+          <p:cNvPr id="2" name="Picture 1" descr="slide-07.png"/>
           <p:cNvPicPr>
             <a:picLocks noChangeAspect="1"/>
           </p:cNvPicPr>
@@ -4191,8 +3708,8 @@
         </p:blipFill>
         <p:spPr>
           <a:xfrm>
-            <a:off x="4648200" y="1600200"/>
-            <a:ext cx="4038600" cy="2002341"/>
+            <a:off x="0" y="0"/>
+            <a:ext cx="4608576" cy="3456432"/>
           </a:xfrm>
           <a:prstGeom prst="rect">
             <a:avLst/>
@@ -4217,30 +3734,9 @@
         <p:nvPr/>
       </p:nvGrpSpPr>
       <p:grpSpPr/>
-      <p:sp>
-        <p:nvSpPr>
-          <p:cNvPr id="2" name="Title 1"/>
-          <p:cNvSpPr>
-            <a:spLocks noGrp="1"/>
-          </p:cNvSpPr>
-          <p:nvPr>
-            <p:ph type="title"/>
-          </p:nvPr>
-        </p:nvSpPr>
-        <p:spPr/>
-        <p:txBody>
-          <a:bodyPr/>
-          <a:lstStyle/>
-          <a:p>
-            <a:r>
-              <a:t>Simulation Results: Latency Impact</a:t>
-            </a:r>
-          </a:p>
-        </p:txBody>
-      </p:sp>
       <p:pic>
         <p:nvPicPr>
-          <p:cNvPr id="3" name="Picture 2" descr="cac_vs_no_cac.png"/>
+          <p:cNvPr id="2" name="Picture 1" descr="slide-08.png"/>
           <p:cNvPicPr>
             <a:picLocks noChangeAspect="1"/>
           </p:cNvPicPr>
@@ -4254,43 +3750,14 @@
         </p:blipFill>
         <p:spPr>
           <a:xfrm>
-            <a:off x="1371600" y="1371600"/>
-            <a:ext cx="6400800" cy="2667000"/>
+            <a:off x="0" y="0"/>
+            <a:ext cx="4608576" cy="3456432"/>
           </a:xfrm>
           <a:prstGeom prst="rect">
             <a:avLst/>
           </a:prstGeom>
         </p:spPr>
       </p:pic>
-      <p:sp>
-        <p:nvSpPr>
-          <p:cNvPr id="4" name="TextBox 3"/>
-          <p:cNvSpPr txBox="1"/>
-          <p:nvPr/>
-        </p:nvSpPr>
-        <p:spPr>
-          <a:xfrm>
-            <a:off x="914400" y="5486400"/>
-            <a:ext cx="7315200" cy="914400"/>
-          </a:xfrm>
-          <a:prstGeom prst="rect">
-            <a:avLst/>
-          </a:prstGeom>
-          <a:noFill/>
-        </p:spPr>
-        <p:txBody>
-          <a:bodyPr wrap="none">
-            <a:spAutoFit/>
-          </a:bodyPr>
-          <a:lstStyle/>
-          <a:p>
-            <a:pPr algn="ctr"/>
-            <a:r>
-              <a:t>Without CAC, latency spikes &gt; 45ms. AS-CAC maintains &lt; 2ms.</a:t>
-            </a:r>
-          </a:p>
-        </p:txBody>
-      </p:sp>
     </p:spTree>
   </p:cSld>
   <p:clrMapOvr>
@@ -4309,30 +3776,9 @@
         <p:nvPr/>
       </p:nvGrpSpPr>
       <p:grpSpPr/>
-      <p:sp>
-        <p:nvSpPr>
-          <p:cNvPr id="2" name="Title 1"/>
-          <p:cNvSpPr>
-            <a:spLocks noGrp="1"/>
-          </p:cNvSpPr>
-          <p:nvPr>
-            <p:ph type="title"/>
-          </p:nvPr>
-        </p:nvSpPr>
-        <p:spPr/>
-        <p:txBody>
-          <a:bodyPr/>
-          <a:lstStyle/>
-          <a:p>
-            <a:r>
-              <a:t>Comprehensive Performance Analysis</a:t>
-            </a:r>
-          </a:p>
-        </p:txBody>
-      </p:sp>
       <p:pic>
         <p:nvPicPr>
-          <p:cNvPr id="3" name="Picture 2" descr="ascac_comprehensive_4panel.png"/>
+          <p:cNvPr id="2" name="Picture 1" descr="slide-09.png"/>
           <p:cNvPicPr>
             <a:picLocks noChangeAspect="1"/>
           </p:cNvPicPr>
@@ -4346,8 +3792,8 @@
         </p:blipFill>
         <p:spPr>
           <a:xfrm>
-            <a:off x="914400" y="1097280"/>
-            <a:ext cx="7315200" cy="5145532"/>
+            <a:off x="0" y="0"/>
+            <a:ext cx="4608576" cy="3456432"/>
           </a:xfrm>
           <a:prstGeom prst="rect">
             <a:avLst/>

</xml_diff>